<commit_message>
Restarted writing a presentation.
</commit_message>
<xml_diff>
--- a/presentations/TechnologyDrivenDevelopment.pptx
+++ b/presentations/TechnologyDrivenDevelopment.pptx
@@ -263,7 +263,7 @@
           <a:p>
             <a:fld id="{94AE22AB-730F-4C4B-A6E7-89E97B93078F}" type="datetimeFigureOut">
               <a:rPr kumimoji="1" lang="ja-JP" altLang="en-US" smtClean="0"/>
-              <a:t>2014/6/15</a:t>
+              <a:t>2014/6/27</a:t>
             </a:fld>
             <a:endParaRPr kumimoji="1" lang="ja-JP" altLang="en-US" dirty="0"/>
           </a:p>
@@ -4239,10 +4239,22 @@
                 <a:ea typeface="+mj-ea"/>
                 <a:cs typeface="Arial" pitchFamily="34" charset="0"/>
               </a:rPr>
-              <a:t>Technology-Driven </a:t>
-            </a:r>
-            <a:r>
-              <a:rPr lang="en-US" altLang="ja-JP" sz="4800" b="1" dirty="0">
+              <a:t>Technology-Driven Development</a:t>
+            </a:r>
+          </a:p>
+          <a:p>
+            <a:endParaRPr lang="en-US" altLang="ja-JP" sz="4400" b="1" dirty="0" smtClean="0">
+              <a:solidFill>
+                <a:srgbClr val="C00000"/>
+              </a:solidFill>
+              <a:latin typeface="+mj-ea"/>
+              <a:ea typeface="+mj-ea"/>
+              <a:cs typeface="Arial" pitchFamily="34" charset="0"/>
+            </a:endParaRPr>
+          </a:p>
+          <a:p>
+            <a:r>
+              <a:rPr lang="en-US" altLang="ja-JP" sz="4400" b="1" dirty="0" smtClean="0">
                 <a:solidFill>
                   <a:srgbClr val="C00000"/>
                 </a:solidFill>
@@ -4250,10 +4262,10 @@
                 <a:ea typeface="+mj-ea"/>
                 <a:cs typeface="Arial" pitchFamily="34" charset="0"/>
               </a:rPr>
-              <a:t>Development</a:t>
-            </a:r>
-            <a:r>
-              <a:rPr lang="en-US" altLang="ja-JP" sz="4800" b="1" dirty="0" smtClean="0">
+              <a:t>Using </a:t>
+            </a:r>
+            <a:r>
+              <a:rPr lang="en-US" altLang="ja-JP" sz="4400" b="1" dirty="0">
                 <a:solidFill>
                   <a:srgbClr val="C00000"/>
                 </a:solidFill>
@@ -4261,12 +4273,10 @@
                 <a:ea typeface="+mj-ea"/>
                 <a:cs typeface="Arial" pitchFamily="34" charset="0"/>
               </a:rPr>
-              <a:t>:</a:t>
-            </a:r>
-          </a:p>
-          <a:p>
-            <a:r>
-              <a:rPr lang="en-US" altLang="ja-JP" sz="4800" b="1" dirty="0" smtClean="0">
+              <a:t>Automation and Development Techniques to Grow an Agile </a:t>
+            </a:r>
+            <a:r>
+              <a:rPr lang="en-US" altLang="ja-JP" sz="4400" b="1" dirty="0" smtClean="0">
                 <a:solidFill>
                   <a:srgbClr val="C00000"/>
                 </a:solidFill>
@@ -4274,53 +4284,7 @@
                 <a:ea typeface="+mj-ea"/>
                 <a:cs typeface="Arial" pitchFamily="34" charset="0"/>
               </a:rPr>
-              <a:t>Using Automation and </a:t>
-            </a:r>
-            <a:r>
-              <a:rPr lang="en-US" altLang="ja-JP" sz="4800" b="1" dirty="0">
-                <a:solidFill>
-                  <a:srgbClr val="C00000"/>
-                </a:solidFill>
-                <a:latin typeface="+mj-ea"/>
-                <a:ea typeface="+mj-ea"/>
-                <a:cs typeface="Arial" pitchFamily="34" charset="0"/>
-              </a:rPr>
-              <a:t>Development </a:t>
-            </a:r>
-            <a:r>
-              <a:rPr lang="en-US" altLang="ja-JP" sz="4800" b="1" dirty="0" smtClean="0">
-                <a:solidFill>
-                  <a:srgbClr val="C00000"/>
-                </a:solidFill>
-                <a:latin typeface="+mj-ea"/>
-                <a:ea typeface="+mj-ea"/>
-                <a:cs typeface="Arial" pitchFamily="34" charset="0"/>
-              </a:rPr>
-              <a:t>Techniques</a:t>
-            </a:r>
-          </a:p>
-          <a:p>
-            <a:r>
-              <a:rPr lang="en-US" altLang="ja-JP" sz="4800" b="1" dirty="0" smtClean="0">
-                <a:solidFill>
-                  <a:srgbClr val="C00000"/>
-                </a:solidFill>
-                <a:latin typeface="+mj-ea"/>
-                <a:ea typeface="+mj-ea"/>
-                <a:cs typeface="Arial" pitchFamily="34" charset="0"/>
-              </a:rPr>
-              <a:t>to </a:t>
-            </a:r>
-            <a:r>
-              <a:rPr lang="en-US" altLang="ja-JP" sz="4800" b="1" dirty="0">
-                <a:solidFill>
-                  <a:srgbClr val="C00000"/>
-                </a:solidFill>
-                <a:latin typeface="+mj-ea"/>
-                <a:ea typeface="+mj-ea"/>
-                <a:cs typeface="Arial" pitchFamily="34" charset="0"/>
-              </a:rPr>
-              <a:t>Grow an Agile Culture</a:t>
+              <a:t>Culture</a:t>
             </a:r>
             <a:endParaRPr lang="en-US" altLang="ja-JP" sz="4800" b="1" dirty="0" smtClean="0">
               <a:solidFill>
@@ -4431,15 +4395,7 @@
                 <a:cs typeface="Arial" pitchFamily="34" charset="0"/>
                 <a:hlinkClick r:id="rId3"/>
               </a:rPr>
-              <a:t>http://www.rakuten.co.jp</a:t>
-            </a:r>
-            <a:r>
-              <a:rPr lang="en-US" altLang="ja-JP" sz="1400" b="1" dirty="0" smtClean="0">
-                <a:latin typeface="Arial" pitchFamily="34" charset="0"/>
-                <a:cs typeface="Arial" pitchFamily="34" charset="0"/>
-                <a:hlinkClick r:id="rId3"/>
-              </a:rPr>
-              <a:t>/</a:t>
+              <a:t>http://www.rakuten.co.jp/</a:t>
             </a:r>
             <a:endParaRPr lang="en-US" altLang="ja-JP" sz="1400" b="1" dirty="0">
               <a:latin typeface="Arial" pitchFamily="34" charset="0"/>
@@ -12024,9 +11980,9 @@
       </p:pic>
       <p:pic>
         <p:nvPicPr>
-          <p:cNvPr id="3" name="図 2" descr="TheHiro.jpg"/>
+          <p:cNvPr id="1026" name="Picture 2" descr="C:\Users\hiroyuki.a.ito\Pictures\Thehiro_v2.jpg"/>
           <p:cNvPicPr>
-            <a:picLocks noChangeAspect="1"/>
+            <a:picLocks noChangeAspect="1" noChangeArrowheads="1"/>
           </p:cNvPicPr>
           <p:nvPr/>
         </p:nvPicPr>
@@ -12038,18 +11994,29 @@
               </a:ext>
             </a:extLst>
           </a:blip>
+          <a:srcRect/>
           <a:stretch>
             <a:fillRect/>
           </a:stretch>
         </p:blipFill>
-        <p:spPr>
+        <p:spPr bwMode="auto">
           <a:xfrm>
-            <a:off x="251520" y="1016732"/>
-            <a:ext cx="3859629" cy="4824536"/>
+            <a:off x="231078" y="1016732"/>
+            <a:ext cx="3429000" cy="3429000"/>
           </a:xfrm>
           <a:prstGeom prst="rect">
             <a:avLst/>
           </a:prstGeom>
+          <a:noFill/>
+          <a:extLst>
+            <a:ext uri="{909E8E84-426E-40DD-AFC4-6F175D3DCCD1}">
+              <a14:hiddenFill xmlns:a14="http://schemas.microsoft.com/office/drawing/2010/main">
+                <a:solidFill>
+                  <a:srgbClr val="FFFFFF"/>
+                </a:solidFill>
+              </a14:hiddenFill>
+            </a:ext>
+          </a:extLst>
         </p:spPr>
       </p:pic>
     </p:spTree>
@@ -30704,12 +30671,9 @@
 </file>
 
 <file path=customXml/item1.xml><?xml version="1.0" encoding="utf-8"?>
-<?mso-contentType ?>
-<FormTemplates xmlns="http://schemas.microsoft.com/sharepoint/v3/contenttype/forms">
-  <Display>DocumentLibraryForm</Display>
-  <Edit>DocumentLibraryForm</Edit>
-  <New>DocumentLibraryForm</New>
-</FormTemplates>
+<p:properties xmlns:p="http://schemas.microsoft.com/office/2006/metadata/properties" xmlns:xsi="http://www.w3.org/2001/XMLSchema-instance">
+  <documentManagement/>
+</p:properties>
 </file>
 
 <file path=customXml/item2.xml><?xml version="1.0" encoding="utf-8"?>
@@ -30762,15 +30726,24 @@
 </file>
 
 <file path=customXml/item3.xml><?xml version="1.0" encoding="utf-8"?>
-<p:properties xmlns:p="http://schemas.microsoft.com/office/2006/metadata/properties" xmlns:xsi="http://www.w3.org/2001/XMLSchema-instance">
-  <documentManagement/>
-</p:properties>
+<?mso-contentType ?>
+<FormTemplates xmlns="http://schemas.microsoft.com/sharepoint/v3/contenttype/forms">
+  <Display>DocumentLibraryForm</Display>
+  <Edit>DocumentLibraryForm</Edit>
+  <New>DocumentLibraryForm</New>
+</FormTemplates>
 </file>
 
 <file path=customXml/itemProps1.xml><?xml version="1.0" encoding="utf-8"?>
-<ds:datastoreItem xmlns:ds="http://schemas.openxmlformats.org/officeDocument/2006/customXml" ds:itemID="{564C25D7-D27D-47E0-8384-6126C745CB52}">
+<ds:datastoreItem xmlns:ds="http://schemas.openxmlformats.org/officeDocument/2006/customXml" ds:itemID="{E52D75E9-7A55-4E2A-89EF-D6493A63AB07}">
   <ds:schemaRefs>
-    <ds:schemaRef ds:uri="http://schemas.microsoft.com/sharepoint/v3/contenttype/forms"/>
+    <ds:schemaRef ds:uri="http://schemas.microsoft.com/office/2006/metadata/properties"/>
+    <ds:schemaRef ds:uri="http://purl.org/dc/dcmitype/"/>
+    <ds:schemaRef ds:uri="http://www.w3.org/XML/1998/namespace"/>
+    <ds:schemaRef ds:uri="http://purl.org/dc/elements/1.1/"/>
+    <ds:schemaRef ds:uri="http://schemas.microsoft.com/office/2006/documentManagement/types"/>
+    <ds:schemaRef ds:uri="http://schemas.openxmlformats.org/package/2006/metadata/core-properties"/>
+    <ds:schemaRef ds:uri="http://purl.org/dc/terms/"/>
   </ds:schemaRefs>
 </ds:datastoreItem>
 </file>
@@ -30791,15 +30764,9 @@
 </file>
 
 <file path=customXml/itemProps3.xml><?xml version="1.0" encoding="utf-8"?>
-<ds:datastoreItem xmlns:ds="http://schemas.openxmlformats.org/officeDocument/2006/customXml" ds:itemID="{E52D75E9-7A55-4E2A-89EF-D6493A63AB07}">
+<ds:datastoreItem xmlns:ds="http://schemas.openxmlformats.org/officeDocument/2006/customXml" ds:itemID="{564C25D7-D27D-47E0-8384-6126C745CB52}">
   <ds:schemaRefs>
-    <ds:schemaRef ds:uri="http://schemas.microsoft.com/office/2006/metadata/properties"/>
-    <ds:schemaRef ds:uri="http://www.w3.org/XML/1998/namespace"/>
-    <ds:schemaRef ds:uri="http://schemas.microsoft.com/office/2006/documentManagement/types"/>
-    <ds:schemaRef ds:uri="http://purl.org/dc/elements/1.1/"/>
-    <ds:schemaRef ds:uri="http://purl.org/dc/terms/"/>
-    <ds:schemaRef ds:uri="http://purl.org/dc/dcmitype/"/>
-    <ds:schemaRef ds:uri="http://schemas.openxmlformats.org/package/2006/metadata/core-properties"/>
+    <ds:schemaRef ds:uri="http://schemas.microsoft.com/sharepoint/v3/contenttype/forms"/>
   </ds:schemaRefs>
 </ds:datastoreItem>
 </file>
</xml_diff>